<commit_message>
Added a script to calculate where the BLC is on Earth.
</commit_message>
<xml_diff>
--- a/reports/20191206_ac6_curtains_in_blc.pptx
+++ b/reports/20191206_ac6_curtains_in_blc.pptx
@@ -10,7 +10,8 @@
     <p:sldId id="258" r:id="rId4"/>
     <p:sldId id="260" r:id="rId5"/>
     <p:sldId id="261" r:id="rId6"/>
-    <p:sldId id="259" r:id="rId7"/>
+    <p:sldId id="262" r:id="rId7"/>
+    <p:sldId id="259" r:id="rId8"/>
   </p:sldIdLst>
   <p:sldSz cx="12192000" cy="6858000"/>
   <p:notesSz cx="6858000" cy="9144000"/>
@@ -3625,30 +3626,22 @@
           <a:p>
             <a:r>
               <a:rPr lang="en-US" dirty="0"/>
-              <a:t>With my fixed code, I found 110 curtains in the BLC</a:t>
+              <a:t>With my fixed code, I found 36 curtains in the BLC</a:t>
             </a:r>
           </a:p>
           <a:p>
             <a:pPr lvl="1"/>
             <a:r>
               <a:rPr lang="en-US" dirty="0"/>
-              <a:t>I defined the BLC perimeter by 56 &lt; </a:t>
+              <a:t>Defined by </a:t>
             </a:r>
             <a:r>
               <a:rPr lang="en-US" dirty="0" err="1"/>
-              <a:t>lat</a:t>
+              <a:t>Loss_Cone_Type</a:t>
             </a:r>
             <a:r>
               <a:rPr lang="en-US" dirty="0"/>
-              <a:t> &lt; 76 and -30 &lt; </a:t>
-            </a:r>
-            <a:r>
-              <a:rPr lang="en-US" dirty="0" err="1"/>
-              <a:t>lon</a:t>
-            </a:r>
-            <a:r>
-              <a:rPr lang="en-US" dirty="0"/>
-              <a:t> &lt; 10</a:t>
+              <a:t> = 2</a:t>
             </a:r>
           </a:p>
           <a:p>
@@ -3675,7 +3668,7 @@
             <a:pPr lvl="1"/>
             <a:r>
               <a:rPr lang="en-US" dirty="0"/>
-              <a:t>Showing the mean-subtracted dos1 count rates</a:t>
+              <a:t>dos1 count rates are mean-subtracted</a:t>
             </a:r>
           </a:p>
         </p:txBody>
@@ -4033,6 +4026,289 @@
 </file>
 
 <file path=ppt/slides/slide6.xml><?xml version="1.0" encoding="utf-8"?>
+<p:sld xmlns:a="http://schemas.openxmlformats.org/drawingml/2006/main" xmlns:r="http://schemas.openxmlformats.org/officeDocument/2006/relationships" xmlns:p="http://schemas.openxmlformats.org/presentationml/2006/main">
+  <p:cSld>
+    <p:spTree>
+      <p:nvGrpSpPr>
+        <p:cNvPr id="1" name=""/>
+        <p:cNvGrpSpPr/>
+        <p:nvPr/>
+      </p:nvGrpSpPr>
+      <p:grpSpPr>
+        <a:xfrm>
+          <a:off x="0" y="0"/>
+          <a:ext cx="0" cy="0"/>
+          <a:chOff x="0" y="0"/>
+          <a:chExt cx="0" cy="0"/>
+        </a:xfrm>
+      </p:grpSpPr>
+      <p:sp>
+        <p:nvSpPr>
+          <p:cNvPr id="19" name="TextBox 18">
+            <a:extLst>
+              <a:ext uri="{FF2B5EF4-FFF2-40B4-BE49-F238E27FC236}">
+                <a16:creationId xmlns:a16="http://schemas.microsoft.com/office/drawing/2014/main" id="{184CAFC1-6269-4A8F-A530-42001FC583D5}"/>
+              </a:ext>
+            </a:extLst>
+          </p:cNvPr>
+          <p:cNvSpPr txBox="1"/>
+          <p:nvPr/>
+        </p:nvSpPr>
+        <p:spPr>
+          <a:xfrm>
+            <a:off x="3256738" y="192455"/>
+            <a:ext cx="5707856" cy="707886"/>
+          </a:xfrm>
+          <a:prstGeom prst="rect">
+            <a:avLst/>
+          </a:prstGeom>
+          <a:noFill/>
+        </p:spPr>
+        <p:txBody>
+          <a:bodyPr wrap="square" rtlCol="0">
+            <a:spAutoFit/>
+          </a:bodyPr>
+          <a:lstStyle/>
+          <a:p>
+            <a:pPr algn="ctr"/>
+            <a:r>
+              <a:rPr lang="en-US" sz="4000" dirty="0"/>
+              <a:t>More examples</a:t>
+            </a:r>
+            <a:endParaRPr lang="en-US" sz="2400" dirty="0"/>
+          </a:p>
+        </p:txBody>
+      </p:sp>
+      <p:pic>
+        <p:nvPicPr>
+          <p:cNvPr id="5" name="Picture 4" descr="A picture containing screenshot&#10;&#10;Description automatically generated">
+            <a:extLst>
+              <a:ext uri="{FF2B5EF4-FFF2-40B4-BE49-F238E27FC236}">
+                <a16:creationId xmlns:a16="http://schemas.microsoft.com/office/drawing/2014/main" id="{04E8DB38-7EC0-4101-9A2B-96D814A81A4C}"/>
+              </a:ext>
+            </a:extLst>
+          </p:cNvPr>
+          <p:cNvPicPr>
+            <a:picLocks noChangeAspect="1"/>
+          </p:cNvPicPr>
+          <p:nvPr/>
+        </p:nvPicPr>
+        <p:blipFill>
+          <a:blip r:embed="rId2">
+            <a:extLst>
+              <a:ext uri="{28A0092B-C50C-407E-A947-70E740481C1C}">
+                <a14:useLocalDpi xmlns:a14="http://schemas.microsoft.com/office/drawing/2010/main" val="0"/>
+              </a:ext>
+            </a:extLst>
+          </a:blip>
+          <a:stretch>
+            <a:fillRect/>
+          </a:stretch>
+        </p:blipFill>
+        <p:spPr>
+          <a:xfrm>
+            <a:off x="352426" y="987855"/>
+            <a:ext cx="3843334" cy="2882500"/>
+          </a:xfrm>
+          <a:prstGeom prst="rect">
+            <a:avLst/>
+          </a:prstGeom>
+        </p:spPr>
+      </p:pic>
+      <p:pic>
+        <p:nvPicPr>
+          <p:cNvPr id="8" name="Picture 7" descr="A picture containing screenshot&#10;&#10;Description automatically generated">
+            <a:extLst>
+              <a:ext uri="{FF2B5EF4-FFF2-40B4-BE49-F238E27FC236}">
+                <a16:creationId xmlns:a16="http://schemas.microsoft.com/office/drawing/2014/main" id="{4348D1B0-8CA0-4F26-902E-26F95B90270F}"/>
+              </a:ext>
+            </a:extLst>
+          </p:cNvPr>
+          <p:cNvPicPr>
+            <a:picLocks noChangeAspect="1"/>
+          </p:cNvPicPr>
+          <p:nvPr/>
+        </p:nvPicPr>
+        <p:blipFill>
+          <a:blip r:embed="rId3">
+            <a:extLst>
+              <a:ext uri="{28A0092B-C50C-407E-A947-70E740481C1C}">
+                <a14:useLocalDpi xmlns:a14="http://schemas.microsoft.com/office/drawing/2010/main" val="0"/>
+              </a:ext>
+            </a:extLst>
+          </a:blip>
+          <a:stretch>
+            <a:fillRect/>
+          </a:stretch>
+        </p:blipFill>
+        <p:spPr>
+          <a:xfrm>
+            <a:off x="7996240" y="987855"/>
+            <a:ext cx="3843334" cy="2882500"/>
+          </a:xfrm>
+          <a:prstGeom prst="rect">
+            <a:avLst/>
+          </a:prstGeom>
+        </p:spPr>
+      </p:pic>
+      <p:pic>
+        <p:nvPicPr>
+          <p:cNvPr id="13" name="Picture 12" descr="A picture containing text&#10;&#10;Description automatically generated">
+            <a:extLst>
+              <a:ext uri="{FF2B5EF4-FFF2-40B4-BE49-F238E27FC236}">
+                <a16:creationId xmlns:a16="http://schemas.microsoft.com/office/drawing/2014/main" id="{0A6A71FA-0C59-49DF-AC9E-DEA119A1D125}"/>
+              </a:ext>
+            </a:extLst>
+          </p:cNvPr>
+          <p:cNvPicPr>
+            <a:picLocks noChangeAspect="1"/>
+          </p:cNvPicPr>
+          <p:nvPr/>
+        </p:nvPicPr>
+        <p:blipFill>
+          <a:blip r:embed="rId4">
+            <a:extLst>
+              <a:ext uri="{28A0092B-C50C-407E-A947-70E740481C1C}">
+                <a14:useLocalDpi xmlns:a14="http://schemas.microsoft.com/office/drawing/2010/main" val="0"/>
+              </a:ext>
+            </a:extLst>
+          </a:blip>
+          <a:stretch>
+            <a:fillRect/>
+          </a:stretch>
+        </p:blipFill>
+        <p:spPr>
+          <a:xfrm>
+            <a:off x="352426" y="3818765"/>
+            <a:ext cx="3843334" cy="2882500"/>
+          </a:xfrm>
+          <a:prstGeom prst="rect">
+            <a:avLst/>
+          </a:prstGeom>
+        </p:spPr>
+      </p:pic>
+      <p:pic>
+        <p:nvPicPr>
+          <p:cNvPr id="17" name="Picture 16" descr="A close up of a logo&#10;&#10;Description automatically generated">
+            <a:extLst>
+              <a:ext uri="{FF2B5EF4-FFF2-40B4-BE49-F238E27FC236}">
+                <a16:creationId xmlns:a16="http://schemas.microsoft.com/office/drawing/2014/main" id="{C99DB384-0AB5-4FCC-80FC-1E5A3B341CDD}"/>
+              </a:ext>
+            </a:extLst>
+          </p:cNvPr>
+          <p:cNvPicPr>
+            <a:picLocks noChangeAspect="1"/>
+          </p:cNvPicPr>
+          <p:nvPr/>
+        </p:nvPicPr>
+        <p:blipFill>
+          <a:blip r:embed="rId5">
+            <a:extLst>
+              <a:ext uri="{28A0092B-C50C-407E-A947-70E740481C1C}">
+                <a14:useLocalDpi xmlns:a14="http://schemas.microsoft.com/office/drawing/2010/main" val="0"/>
+              </a:ext>
+            </a:extLst>
+          </a:blip>
+          <a:stretch>
+            <a:fillRect/>
+          </a:stretch>
+        </p:blipFill>
+        <p:spPr>
+          <a:xfrm>
+            <a:off x="4281489" y="1023342"/>
+            <a:ext cx="3843334" cy="2882500"/>
+          </a:xfrm>
+          <a:prstGeom prst="rect">
+            <a:avLst/>
+          </a:prstGeom>
+        </p:spPr>
+      </p:pic>
+      <p:pic>
+        <p:nvPicPr>
+          <p:cNvPr id="22" name="Picture 21" descr="A close up of text on a white background&#10;&#10;Description automatically generated">
+            <a:extLst>
+              <a:ext uri="{FF2B5EF4-FFF2-40B4-BE49-F238E27FC236}">
+                <a16:creationId xmlns:a16="http://schemas.microsoft.com/office/drawing/2014/main" id="{E112E433-52BD-4B21-B712-912F647F9590}"/>
+              </a:ext>
+            </a:extLst>
+          </p:cNvPr>
+          <p:cNvPicPr>
+            <a:picLocks noChangeAspect="1"/>
+          </p:cNvPicPr>
+          <p:nvPr/>
+        </p:nvPicPr>
+        <p:blipFill>
+          <a:blip r:embed="rId6">
+            <a:extLst>
+              <a:ext uri="{28A0092B-C50C-407E-A947-70E740481C1C}">
+                <a14:useLocalDpi xmlns:a14="http://schemas.microsoft.com/office/drawing/2010/main" val="0"/>
+              </a:ext>
+            </a:extLst>
+          </a:blip>
+          <a:stretch>
+            <a:fillRect/>
+          </a:stretch>
+        </p:blipFill>
+        <p:spPr>
+          <a:xfrm>
+            <a:off x="4317205" y="3837983"/>
+            <a:ext cx="3843334" cy="2882500"/>
+          </a:xfrm>
+          <a:prstGeom prst="rect">
+            <a:avLst/>
+          </a:prstGeom>
+        </p:spPr>
+      </p:pic>
+      <p:pic>
+        <p:nvPicPr>
+          <p:cNvPr id="24" name="Picture 23" descr="A picture containing text&#10;&#10;Description automatically generated">
+            <a:extLst>
+              <a:ext uri="{FF2B5EF4-FFF2-40B4-BE49-F238E27FC236}">
+                <a16:creationId xmlns:a16="http://schemas.microsoft.com/office/drawing/2014/main" id="{9A124D98-76ED-4C30-8D26-F5C16095DC77}"/>
+              </a:ext>
+            </a:extLst>
+          </p:cNvPr>
+          <p:cNvPicPr>
+            <a:picLocks noChangeAspect="1"/>
+          </p:cNvPicPr>
+          <p:nvPr/>
+        </p:nvPicPr>
+        <p:blipFill>
+          <a:blip r:embed="rId7">
+            <a:extLst>
+              <a:ext uri="{28A0092B-C50C-407E-A947-70E740481C1C}">
+                <a14:useLocalDpi xmlns:a14="http://schemas.microsoft.com/office/drawing/2010/main" val="0"/>
+              </a:ext>
+            </a:extLst>
+          </a:blip>
+          <a:stretch>
+            <a:fillRect/>
+          </a:stretch>
+        </p:blipFill>
+        <p:spPr>
+          <a:xfrm>
+            <a:off x="7952672" y="3870355"/>
+            <a:ext cx="3930470" cy="2947850"/>
+          </a:xfrm>
+          <a:prstGeom prst="rect">
+            <a:avLst/>
+          </a:prstGeom>
+        </p:spPr>
+      </p:pic>
+    </p:spTree>
+    <p:extLst>
+      <p:ext uri="{BB962C8B-B14F-4D97-AF65-F5344CB8AC3E}">
+        <p14:creationId xmlns:p14="http://schemas.microsoft.com/office/powerpoint/2010/main" val="2792111117"/>
+      </p:ext>
+    </p:extLst>
+  </p:cSld>
+  <p:clrMapOvr>
+    <a:masterClrMapping/>
+  </p:clrMapOvr>
+</p:sld>
+</file>
+
+<file path=ppt/slides/slide7.xml><?xml version="1.0" encoding="utf-8"?>
 <p:sld xmlns:a="http://schemas.openxmlformats.org/drawingml/2006/main" xmlns:r="http://schemas.openxmlformats.org/officeDocument/2006/relationships" xmlns:p="http://schemas.openxmlformats.org/presentationml/2006/main">
   <p:cSld>
     <p:spTree>

</xml_diff>